<commit_message>
HDL updated lecture notes
</commit_message>
<xml_diff>
--- a/07 - Hardware Description Languages/slides.pptx
+++ b/07 - Hardware Description Languages/slides.pptx
@@ -311,7 +311,7 @@
 <file path=ppt/revisionInfo.xml><?xml version="1.0" encoding="utf-8"?>
 <p1510:revInfo xmlns:a="http://schemas.openxmlformats.org/drawingml/2006/main" xmlns:r="http://schemas.openxmlformats.org/officeDocument/2006/relationships" xmlns:p1510="http://schemas.microsoft.com/office/powerpoint/2015/10/main">
   <p1510:revLst>
-    <p1510:client id="{AC8554A9-6C9F-E14B-9DBB-4208B0A100EA}" v="268" dt="2025-11-04T15:58:37.158"/>
+    <p1510:client id="{AC8554A9-6C9F-E14B-9DBB-4208B0A100EA}" v="272" dt="2025-11-07T08:13:11.396"/>
   </p1510:revLst>
 </p1510:revInfo>
 </file>
@@ -321,7 +321,7 @@
   <pc:docChgLst>
     <pc:chgData name="Riccardo Berta" userId="c8694f89-bba4-4576-b0a8-456619ca5a8c" providerId="ADAL" clId="{FDDBFC5A-5EA9-5330-BEB8-433D7E3B4C4E}"/>
     <pc:docChg chg="undo redo custSel addSld delSld modSld">
-      <pc:chgData name="Riccardo Berta" userId="c8694f89-bba4-4576-b0a8-456619ca5a8c" providerId="ADAL" clId="{FDDBFC5A-5EA9-5330-BEB8-433D7E3B4C4E}" dt="2025-11-04T15:58:42.661" v="9111" actId="1076"/>
+      <pc:chgData name="Riccardo Berta" userId="c8694f89-bba4-4576-b0a8-456619ca5a8c" providerId="ADAL" clId="{FDDBFC5A-5EA9-5330-BEB8-433D7E3B4C4E}" dt="2025-11-07T08:14:17.977" v="9166" actId="20577"/>
       <pc:docMkLst>
         <pc:docMk/>
       </pc:docMkLst>
@@ -423,102 +423,6 @@
             <ac:spMk id="3" creationId="{59C7042C-2258-FE34-8898-26C890B9B5E3}"/>
           </ac:spMkLst>
         </pc:spChg>
-        <pc:spChg chg="add">
-          <ac:chgData name="Riccardo Berta" userId="c8694f89-bba4-4576-b0a8-456619ca5a8c" providerId="ADAL" clId="{FDDBFC5A-5EA9-5330-BEB8-433D7E3B4C4E}" dt="2025-11-04T09:04:23.579" v="3083"/>
-          <ac:spMkLst>
-            <pc:docMk/>
-            <pc:sldMk cId="1418674229" sldId="290"/>
-            <ac:spMk id="4" creationId="{08BAF24A-4C36-FF48-318F-FAA054C97E6D}"/>
-          </ac:spMkLst>
-        </pc:spChg>
-        <pc:spChg chg="add">
-          <ac:chgData name="Riccardo Berta" userId="c8694f89-bba4-4576-b0a8-456619ca5a8c" providerId="ADAL" clId="{FDDBFC5A-5EA9-5330-BEB8-433D7E3B4C4E}" dt="2025-11-04T09:04:23.579" v="3083"/>
-          <ac:spMkLst>
-            <pc:docMk/>
-            <pc:sldMk cId="1418674229" sldId="290"/>
-            <ac:spMk id="5" creationId="{908C57D3-AB2F-51D8-8C9D-B8090CAA3934}"/>
-          </ac:spMkLst>
-        </pc:spChg>
-        <pc:spChg chg="add">
-          <ac:chgData name="Riccardo Berta" userId="c8694f89-bba4-4576-b0a8-456619ca5a8c" providerId="ADAL" clId="{FDDBFC5A-5EA9-5330-BEB8-433D7E3B4C4E}" dt="2025-11-04T09:04:23.579" v="3083"/>
-          <ac:spMkLst>
-            <pc:docMk/>
-            <pc:sldMk cId="1418674229" sldId="290"/>
-            <ac:spMk id="6" creationId="{692D1E96-E3E6-C584-8180-5AA90A750903}"/>
-          </ac:spMkLst>
-        </pc:spChg>
-        <pc:spChg chg="add">
-          <ac:chgData name="Riccardo Berta" userId="c8694f89-bba4-4576-b0a8-456619ca5a8c" providerId="ADAL" clId="{FDDBFC5A-5EA9-5330-BEB8-433D7E3B4C4E}" dt="2025-11-04T09:04:23.579" v="3083"/>
-          <ac:spMkLst>
-            <pc:docMk/>
-            <pc:sldMk cId="1418674229" sldId="290"/>
-            <ac:spMk id="7" creationId="{2AAB52F2-7533-3DC5-FF58-D8D138CDB996}"/>
-          </ac:spMkLst>
-        </pc:spChg>
-        <pc:spChg chg="add">
-          <ac:chgData name="Riccardo Berta" userId="c8694f89-bba4-4576-b0a8-456619ca5a8c" providerId="ADAL" clId="{FDDBFC5A-5EA9-5330-BEB8-433D7E3B4C4E}" dt="2025-11-04T09:04:23.579" v="3083"/>
-          <ac:spMkLst>
-            <pc:docMk/>
-            <pc:sldMk cId="1418674229" sldId="290"/>
-            <ac:spMk id="8" creationId="{FF2F6E1D-365E-5D47-1A71-4130ECB1A8B6}"/>
-          </ac:spMkLst>
-        </pc:spChg>
-        <pc:spChg chg="add">
-          <ac:chgData name="Riccardo Berta" userId="c8694f89-bba4-4576-b0a8-456619ca5a8c" providerId="ADAL" clId="{FDDBFC5A-5EA9-5330-BEB8-433D7E3B4C4E}" dt="2025-11-04T09:04:23.579" v="3083"/>
-          <ac:spMkLst>
-            <pc:docMk/>
-            <pc:sldMk cId="1418674229" sldId="290"/>
-            <ac:spMk id="9" creationId="{8D546ADC-86EE-66E2-485A-F2ECE51FAE83}"/>
-          </ac:spMkLst>
-        </pc:spChg>
-        <pc:spChg chg="add">
-          <ac:chgData name="Riccardo Berta" userId="c8694f89-bba4-4576-b0a8-456619ca5a8c" providerId="ADAL" clId="{FDDBFC5A-5EA9-5330-BEB8-433D7E3B4C4E}" dt="2025-11-04T09:04:29.095" v="3084"/>
-          <ac:spMkLst>
-            <pc:docMk/>
-            <pc:sldMk cId="1418674229" sldId="290"/>
-            <ac:spMk id="10" creationId="{644CBF4B-54D2-C7BF-1BB7-FED7E1910B06}"/>
-          </ac:spMkLst>
-        </pc:spChg>
-        <pc:spChg chg="add">
-          <ac:chgData name="Riccardo Berta" userId="c8694f89-bba4-4576-b0a8-456619ca5a8c" providerId="ADAL" clId="{FDDBFC5A-5EA9-5330-BEB8-433D7E3B4C4E}" dt="2025-11-04T09:04:29.095" v="3084"/>
-          <ac:spMkLst>
-            <pc:docMk/>
-            <pc:sldMk cId="1418674229" sldId="290"/>
-            <ac:spMk id="11" creationId="{F99C83A3-70AE-6275-6779-DCC167FB92A5}"/>
-          </ac:spMkLst>
-        </pc:spChg>
-        <pc:spChg chg="add">
-          <ac:chgData name="Riccardo Berta" userId="c8694f89-bba4-4576-b0a8-456619ca5a8c" providerId="ADAL" clId="{FDDBFC5A-5EA9-5330-BEB8-433D7E3B4C4E}" dt="2025-11-04T09:04:29.095" v="3084"/>
-          <ac:spMkLst>
-            <pc:docMk/>
-            <pc:sldMk cId="1418674229" sldId="290"/>
-            <ac:spMk id="12" creationId="{30D75FC8-2738-A2CF-3B5B-A23F9A17E3B6}"/>
-          </ac:spMkLst>
-        </pc:spChg>
-        <pc:spChg chg="add">
-          <ac:chgData name="Riccardo Berta" userId="c8694f89-bba4-4576-b0a8-456619ca5a8c" providerId="ADAL" clId="{FDDBFC5A-5EA9-5330-BEB8-433D7E3B4C4E}" dt="2025-11-04T09:04:29.095" v="3084"/>
-          <ac:spMkLst>
-            <pc:docMk/>
-            <pc:sldMk cId="1418674229" sldId="290"/>
-            <ac:spMk id="13" creationId="{EF1C2F4E-4E2E-7D96-59AA-8912D8872257}"/>
-          </ac:spMkLst>
-        </pc:spChg>
-        <pc:spChg chg="add">
-          <ac:chgData name="Riccardo Berta" userId="c8694f89-bba4-4576-b0a8-456619ca5a8c" providerId="ADAL" clId="{FDDBFC5A-5EA9-5330-BEB8-433D7E3B4C4E}" dt="2025-11-04T09:04:29.095" v="3084"/>
-          <ac:spMkLst>
-            <pc:docMk/>
-            <pc:sldMk cId="1418674229" sldId="290"/>
-            <ac:spMk id="14" creationId="{EAE6F8AC-AC31-EBD5-4E67-66C7AB56A14E}"/>
-          </ac:spMkLst>
-        </pc:spChg>
-        <pc:spChg chg="add">
-          <ac:chgData name="Riccardo Berta" userId="c8694f89-bba4-4576-b0a8-456619ca5a8c" providerId="ADAL" clId="{FDDBFC5A-5EA9-5330-BEB8-433D7E3B4C4E}" dt="2025-11-04T09:04:29.095" v="3084"/>
-          <ac:spMkLst>
-            <pc:docMk/>
-            <pc:sldMk cId="1418674229" sldId="290"/>
-            <ac:spMk id="15" creationId="{D0EE59DC-4105-05DF-225D-6530C78EFD3B}"/>
-          </ac:spMkLst>
-        </pc:spChg>
         <pc:picChg chg="add mod">
           <ac:chgData name="Riccardo Berta" userId="c8694f89-bba4-4576-b0a8-456619ca5a8c" providerId="ADAL" clId="{FDDBFC5A-5EA9-5330-BEB8-433D7E3B4C4E}" dt="2025-11-04T09:11:32.396" v="3320" actId="1076"/>
           <ac:picMkLst>
@@ -602,86 +506,6 @@
             <pc:docMk/>
             <pc:sldMk cId="3072664603" sldId="293"/>
             <ac:spMk id="3" creationId="{C9607F1E-AC65-A95D-ADDC-E48A8F8E22E3}"/>
-          </ac:spMkLst>
-        </pc:spChg>
-        <pc:spChg chg="add">
-          <ac:chgData name="Riccardo Berta" userId="c8694f89-bba4-4576-b0a8-456619ca5a8c" providerId="ADAL" clId="{FDDBFC5A-5EA9-5330-BEB8-433D7E3B4C4E}" dt="2025-11-04T09:52:21.252" v="3641"/>
-          <ac:spMkLst>
-            <pc:docMk/>
-            <pc:sldMk cId="3072664603" sldId="293"/>
-            <ac:spMk id="4" creationId="{6F82348C-6033-07FA-001E-13CBC1B39EE6}"/>
-          </ac:spMkLst>
-        </pc:spChg>
-        <pc:spChg chg="add">
-          <ac:chgData name="Riccardo Berta" userId="c8694f89-bba4-4576-b0a8-456619ca5a8c" providerId="ADAL" clId="{FDDBFC5A-5EA9-5330-BEB8-433D7E3B4C4E}" dt="2025-11-04T09:52:21.252" v="3641"/>
-          <ac:spMkLst>
-            <pc:docMk/>
-            <pc:sldMk cId="3072664603" sldId="293"/>
-            <ac:spMk id="5" creationId="{30B78E17-055A-4950-3FD0-B8C32069C47E}"/>
-          </ac:spMkLst>
-        </pc:spChg>
-        <pc:spChg chg="add">
-          <ac:chgData name="Riccardo Berta" userId="c8694f89-bba4-4576-b0a8-456619ca5a8c" providerId="ADAL" clId="{FDDBFC5A-5EA9-5330-BEB8-433D7E3B4C4E}" dt="2025-11-04T09:52:21.252" v="3641"/>
-          <ac:spMkLst>
-            <pc:docMk/>
-            <pc:sldMk cId="3072664603" sldId="293"/>
-            <ac:spMk id="6" creationId="{B6F5ADD2-8B25-5E24-1016-44EDD3599EA1}"/>
-          </ac:spMkLst>
-        </pc:spChg>
-        <pc:spChg chg="add">
-          <ac:chgData name="Riccardo Berta" userId="c8694f89-bba4-4576-b0a8-456619ca5a8c" providerId="ADAL" clId="{FDDBFC5A-5EA9-5330-BEB8-433D7E3B4C4E}" dt="2025-11-04T09:52:21.252" v="3641"/>
-          <ac:spMkLst>
-            <pc:docMk/>
-            <pc:sldMk cId="3072664603" sldId="293"/>
-            <ac:spMk id="7" creationId="{9DF27E29-6A9A-599E-541A-BE7AB8483E95}"/>
-          </ac:spMkLst>
-        </pc:spChg>
-        <pc:spChg chg="add">
-          <ac:chgData name="Riccardo Berta" userId="c8694f89-bba4-4576-b0a8-456619ca5a8c" providerId="ADAL" clId="{FDDBFC5A-5EA9-5330-BEB8-433D7E3B4C4E}" dt="2025-11-04T09:52:21.252" v="3641"/>
-          <ac:spMkLst>
-            <pc:docMk/>
-            <pc:sldMk cId="3072664603" sldId="293"/>
-            <ac:spMk id="8" creationId="{B0E16C88-686F-A124-A6BD-DF4981D504CE}"/>
-          </ac:spMkLst>
-        </pc:spChg>
-        <pc:spChg chg="add">
-          <ac:chgData name="Riccardo Berta" userId="c8694f89-bba4-4576-b0a8-456619ca5a8c" providerId="ADAL" clId="{FDDBFC5A-5EA9-5330-BEB8-433D7E3B4C4E}" dt="2025-11-04T09:52:21.252" v="3641"/>
-          <ac:spMkLst>
-            <pc:docMk/>
-            <pc:sldMk cId="3072664603" sldId="293"/>
-            <ac:spMk id="10" creationId="{68DBB47A-7036-6FCF-EA3E-2D141FAF7222}"/>
-          </ac:spMkLst>
-        </pc:spChg>
-        <pc:spChg chg="add">
-          <ac:chgData name="Riccardo Berta" userId="c8694f89-bba4-4576-b0a8-456619ca5a8c" providerId="ADAL" clId="{FDDBFC5A-5EA9-5330-BEB8-433D7E3B4C4E}" dt="2025-11-04T09:52:21.252" v="3641"/>
-          <ac:spMkLst>
-            <pc:docMk/>
-            <pc:sldMk cId="3072664603" sldId="293"/>
-            <ac:spMk id="12" creationId="{CB42BCDA-DC4D-B7D3-6654-41F075874F75}"/>
-          </ac:spMkLst>
-        </pc:spChg>
-        <pc:spChg chg="add">
-          <ac:chgData name="Riccardo Berta" userId="c8694f89-bba4-4576-b0a8-456619ca5a8c" providerId="ADAL" clId="{FDDBFC5A-5EA9-5330-BEB8-433D7E3B4C4E}" dt="2025-11-04T09:52:21.252" v="3641"/>
-          <ac:spMkLst>
-            <pc:docMk/>
-            <pc:sldMk cId="3072664603" sldId="293"/>
-            <ac:spMk id="13" creationId="{8051806E-1EDF-9F22-EE0F-A382023B2D82}"/>
-          </ac:spMkLst>
-        </pc:spChg>
-        <pc:spChg chg="add">
-          <ac:chgData name="Riccardo Berta" userId="c8694f89-bba4-4576-b0a8-456619ca5a8c" providerId="ADAL" clId="{FDDBFC5A-5EA9-5330-BEB8-433D7E3B4C4E}" dt="2025-11-04T09:52:21.252" v="3641"/>
-          <ac:spMkLst>
-            <pc:docMk/>
-            <pc:sldMk cId="3072664603" sldId="293"/>
-            <ac:spMk id="14" creationId="{01CC6077-F407-EC2F-00B9-A650B2A6D5A3}"/>
-          </ac:spMkLst>
-        </pc:spChg>
-        <pc:spChg chg="add">
-          <ac:chgData name="Riccardo Berta" userId="c8694f89-bba4-4576-b0a8-456619ca5a8c" providerId="ADAL" clId="{FDDBFC5A-5EA9-5330-BEB8-433D7E3B4C4E}" dt="2025-11-04T09:52:21.252" v="3641"/>
-          <ac:spMkLst>
-            <pc:docMk/>
-            <pc:sldMk cId="3072664603" sldId="293"/>
-            <ac:spMk id="15" creationId="{10767FB5-DA95-7875-B623-AFF9ECC4490F}"/>
           </ac:spMkLst>
         </pc:spChg>
         <pc:picChg chg="add mod">
@@ -895,14 +719,6 @@
             <ac:spMk id="3" creationId="{DA13E61E-6191-0245-BF6B-C4054F218302}"/>
           </ac:spMkLst>
         </pc:spChg>
-        <pc:picChg chg="add del mod">
-          <ac:chgData name="Riccardo Berta" userId="c8694f89-bba4-4576-b0a8-456619ca5a8c" providerId="ADAL" clId="{FDDBFC5A-5EA9-5330-BEB8-433D7E3B4C4E}" dt="2025-11-04T10:23:28.991" v="4248" actId="478"/>
-          <ac:picMkLst>
-            <pc:docMk/>
-            <pc:sldMk cId="2616000796" sldId="298"/>
-            <ac:picMk id="5" creationId="{B4ED785D-E4DF-5C98-CEEF-8533E0407064}"/>
-          </ac:picMkLst>
-        </pc:picChg>
         <pc:picChg chg="add mod">
           <ac:chgData name="Riccardo Berta" userId="c8694f89-bba4-4576-b0a8-456619ca5a8c" providerId="ADAL" clId="{FDDBFC5A-5EA9-5330-BEB8-433D7E3B4C4E}" dt="2025-11-04T12:24:45.272" v="5060" actId="1076"/>
           <ac:picMkLst>
@@ -1012,14 +828,6 @@
             <ac:spMk id="3" creationId="{59650487-81C7-5E1C-FC12-F01A586E8E06}"/>
           </ac:spMkLst>
         </pc:spChg>
-        <pc:picChg chg="add del mod">
-          <ac:chgData name="Riccardo Berta" userId="c8694f89-bba4-4576-b0a8-456619ca5a8c" providerId="ADAL" clId="{FDDBFC5A-5EA9-5330-BEB8-433D7E3B4C4E}" dt="2025-11-04T10:48:07.124" v="4809" actId="478"/>
-          <ac:picMkLst>
-            <pc:docMk/>
-            <pc:sldMk cId="291410552" sldId="301"/>
-            <ac:picMk id="5" creationId="{B115DCB6-4555-651B-F887-0AF86D547F20}"/>
-          </ac:picMkLst>
-        </pc:picChg>
         <pc:picChg chg="add mod">
           <ac:chgData name="Riccardo Berta" userId="c8694f89-bba4-4576-b0a8-456619ca5a8c" providerId="ADAL" clId="{FDDBFC5A-5EA9-5330-BEB8-433D7E3B4C4E}" dt="2025-11-04T14:48:30.073" v="7800" actId="14100"/>
           <ac:picMkLst>
@@ -1272,7 +1080,7 @@
         </pc:picChg>
       </pc:sldChg>
       <pc:sldChg chg="modSp add mod">
-        <pc:chgData name="Riccardo Berta" userId="c8694f89-bba4-4576-b0a8-456619ca5a8c" providerId="ADAL" clId="{FDDBFC5A-5EA9-5330-BEB8-433D7E3B4C4E}" dt="2025-11-04T13:02:15.391" v="5950" actId="14100"/>
+        <pc:chgData name="Riccardo Berta" userId="c8694f89-bba4-4576-b0a8-456619ca5a8c" providerId="ADAL" clId="{FDDBFC5A-5EA9-5330-BEB8-433D7E3B4C4E}" dt="2025-11-07T06:30:19.834" v="9112" actId="20577"/>
         <pc:sldMkLst>
           <pc:docMk/>
           <pc:sldMk cId="2770338725" sldId="308"/>
@@ -1286,7 +1094,7 @@
           </ac:spMkLst>
         </pc:spChg>
         <pc:spChg chg="mod">
-          <ac:chgData name="Riccardo Berta" userId="c8694f89-bba4-4576-b0a8-456619ca5a8c" providerId="ADAL" clId="{FDDBFC5A-5EA9-5330-BEB8-433D7E3B4C4E}" dt="2025-11-04T13:02:15.391" v="5950" actId="14100"/>
+          <ac:chgData name="Riccardo Berta" userId="c8694f89-bba4-4576-b0a8-456619ca5a8c" providerId="ADAL" clId="{FDDBFC5A-5EA9-5330-BEB8-433D7E3B4C4E}" dt="2025-11-07T06:30:19.834" v="9112" actId="20577"/>
           <ac:spMkLst>
             <pc:docMk/>
             <pc:sldMk cId="2770338725" sldId="308"/>
@@ -1295,7 +1103,7 @@
         </pc:spChg>
       </pc:sldChg>
       <pc:sldChg chg="addSp delSp modSp add mod">
-        <pc:chgData name="Riccardo Berta" userId="c8694f89-bba4-4576-b0a8-456619ca5a8c" providerId="ADAL" clId="{FDDBFC5A-5EA9-5330-BEB8-433D7E3B4C4E}" dt="2025-11-04T13:22:37.416" v="6122" actId="1076"/>
+        <pc:chgData name="Riccardo Berta" userId="c8694f89-bba4-4576-b0a8-456619ca5a8c" providerId="ADAL" clId="{FDDBFC5A-5EA9-5330-BEB8-433D7E3B4C4E}" dt="2025-11-07T07:07:43.023" v="9114" actId="1076"/>
         <pc:sldMkLst>
           <pc:docMk/>
           <pc:sldMk cId="20563438" sldId="309"/>
@@ -1309,7 +1117,7 @@
           </ac:spMkLst>
         </pc:spChg>
         <pc:spChg chg="mod">
-          <ac:chgData name="Riccardo Berta" userId="c8694f89-bba4-4576-b0a8-456619ca5a8c" providerId="ADAL" clId="{FDDBFC5A-5EA9-5330-BEB8-433D7E3B4C4E}" dt="2025-11-04T13:22:28.484" v="6119" actId="21"/>
+          <ac:chgData name="Riccardo Berta" userId="c8694f89-bba4-4576-b0a8-456619ca5a8c" providerId="ADAL" clId="{FDDBFC5A-5EA9-5330-BEB8-433D7E3B4C4E}" dt="2025-11-07T07:07:40.550" v="9113" actId="20577"/>
           <ac:spMkLst>
             <pc:docMk/>
             <pc:sldMk cId="20563438" sldId="309"/>
@@ -1317,19 +1125,11 @@
           </ac:spMkLst>
         </pc:spChg>
         <pc:picChg chg="add mod">
-          <ac:chgData name="Riccardo Berta" userId="c8694f89-bba4-4576-b0a8-456619ca5a8c" providerId="ADAL" clId="{FDDBFC5A-5EA9-5330-BEB8-433D7E3B4C4E}" dt="2025-11-04T13:22:37.416" v="6122" actId="1076"/>
+          <ac:chgData name="Riccardo Berta" userId="c8694f89-bba4-4576-b0a8-456619ca5a8c" providerId="ADAL" clId="{FDDBFC5A-5EA9-5330-BEB8-433D7E3B4C4E}" dt="2025-11-07T07:07:43.023" v="9114" actId="1076"/>
           <ac:picMkLst>
             <pc:docMk/>
             <pc:sldMk cId="20563438" sldId="309"/>
             <ac:picMk id="5" creationId="{2A9AA8A8-2A9F-1CF9-C0D0-D4E64ED2E76D}"/>
-          </ac:picMkLst>
-        </pc:picChg>
-        <pc:picChg chg="add del mod">
-          <ac:chgData name="Riccardo Berta" userId="c8694f89-bba4-4576-b0a8-456619ca5a8c" providerId="ADAL" clId="{FDDBFC5A-5EA9-5330-BEB8-433D7E3B4C4E}" dt="2025-11-04T13:22:32.704" v="6121" actId="478"/>
-          <ac:picMkLst>
-            <pc:docMk/>
-            <pc:sldMk cId="20563438" sldId="309"/>
-            <ac:picMk id="7" creationId="{1509E991-4BF5-9365-38F6-178383B8F1DA}"/>
           </ac:picMkLst>
         </pc:picChg>
       </pc:sldChg>
@@ -1363,14 +1163,6 @@
             <ac:picMk id="5" creationId="{2E95C689-4C34-3A81-BBCD-D261AE13E820}"/>
           </ac:picMkLst>
         </pc:picChg>
-        <pc:picChg chg="add del mod">
-          <ac:chgData name="Riccardo Berta" userId="c8694f89-bba4-4576-b0a8-456619ca5a8c" providerId="ADAL" clId="{FDDBFC5A-5EA9-5330-BEB8-433D7E3B4C4E}" dt="2025-11-04T14:18:06.208" v="7298" actId="478"/>
-          <ac:picMkLst>
-            <pc:docMk/>
-            <pc:sldMk cId="2386627086" sldId="310"/>
-            <ac:picMk id="7" creationId="{DFAFAC31-4D2B-1DE9-AD27-0BC0A2152AB2}"/>
-          </ac:picMkLst>
-        </pc:picChg>
         <pc:picChg chg="add mod">
           <ac:chgData name="Riccardo Berta" userId="c8694f89-bba4-4576-b0a8-456619ca5a8c" providerId="ADAL" clId="{FDDBFC5A-5EA9-5330-BEB8-433D7E3B4C4E}" dt="2025-11-04T14:18:38.982" v="7312" actId="1076"/>
           <ac:picMkLst>
@@ -1381,7 +1173,7 @@
         </pc:picChg>
       </pc:sldChg>
       <pc:sldChg chg="addSp modSp add mod">
-        <pc:chgData name="Riccardo Berta" userId="c8694f89-bba4-4576-b0a8-456619ca5a8c" providerId="ADAL" clId="{FDDBFC5A-5EA9-5330-BEB8-433D7E3B4C4E}" dt="2025-11-04T13:40:01.478" v="6409" actId="20577"/>
+        <pc:chgData name="Riccardo Berta" userId="c8694f89-bba4-4576-b0a8-456619ca5a8c" providerId="ADAL" clId="{FDDBFC5A-5EA9-5330-BEB8-433D7E3B4C4E}" dt="2025-11-07T07:49:26.865" v="9140" actId="1036"/>
         <pc:sldMkLst>
           <pc:docMk/>
           <pc:sldMk cId="1452086509" sldId="311"/>
@@ -1395,7 +1187,7 @@
           </ac:spMkLst>
         </pc:spChg>
         <pc:spChg chg="mod">
-          <ac:chgData name="Riccardo Berta" userId="c8694f89-bba4-4576-b0a8-456619ca5a8c" providerId="ADAL" clId="{FDDBFC5A-5EA9-5330-BEB8-433D7E3B4C4E}" dt="2025-11-04T13:40:01.478" v="6409" actId="20577"/>
+          <ac:chgData name="Riccardo Berta" userId="c8694f89-bba4-4576-b0a8-456619ca5a8c" providerId="ADAL" clId="{FDDBFC5A-5EA9-5330-BEB8-433D7E3B4C4E}" dt="2025-11-07T07:09:12.684" v="9128" actId="20577"/>
           <ac:spMkLst>
             <pc:docMk/>
             <pc:sldMk cId="1452086509" sldId="311"/>
@@ -1411,7 +1203,7 @@
           </ac:picMkLst>
         </pc:picChg>
         <pc:picChg chg="add mod">
-          <ac:chgData name="Riccardo Berta" userId="c8694f89-bba4-4576-b0a8-456619ca5a8c" providerId="ADAL" clId="{FDDBFC5A-5EA9-5330-BEB8-433D7E3B4C4E}" dt="2025-11-04T13:38:46.980" v="6369" actId="1076"/>
+          <ac:chgData name="Riccardo Berta" userId="c8694f89-bba4-4576-b0a8-456619ca5a8c" providerId="ADAL" clId="{FDDBFC5A-5EA9-5330-BEB8-433D7E3B4C4E}" dt="2025-11-07T07:49:26.865" v="9140" actId="1036"/>
           <ac:picMkLst>
             <pc:docMk/>
             <pc:sldMk cId="1452086509" sldId="311"/>
@@ -1419,7 +1211,7 @@
           </ac:picMkLst>
         </pc:picChg>
         <pc:picChg chg="add mod">
-          <ac:chgData name="Riccardo Berta" userId="c8694f89-bba4-4576-b0a8-456619ca5a8c" providerId="ADAL" clId="{FDDBFC5A-5EA9-5330-BEB8-433D7E3B4C4E}" dt="2025-11-04T13:39:59.554" v="6407" actId="1076"/>
+          <ac:chgData name="Riccardo Berta" userId="c8694f89-bba4-4576-b0a8-456619ca5a8c" providerId="ADAL" clId="{FDDBFC5A-5EA9-5330-BEB8-433D7E3B4C4E}" dt="2025-11-07T07:09:20.158" v="9130" actId="1076"/>
           <ac:picMkLst>
             <pc:docMk/>
             <pc:sldMk cId="1452086509" sldId="311"/>
@@ -1451,7 +1243,7 @@
         </pc:spChg>
       </pc:sldChg>
       <pc:sldChg chg="addSp modSp add mod">
-        <pc:chgData name="Riccardo Berta" userId="c8694f89-bba4-4576-b0a8-456619ca5a8c" providerId="ADAL" clId="{FDDBFC5A-5EA9-5330-BEB8-433D7E3B4C4E}" dt="2025-11-04T13:54:59.055" v="6818" actId="1035"/>
+        <pc:chgData name="Riccardo Berta" userId="c8694f89-bba4-4576-b0a8-456619ca5a8c" providerId="ADAL" clId="{FDDBFC5A-5EA9-5330-BEB8-433D7E3B4C4E}" dt="2025-11-07T07:11:46.059" v="9131" actId="20577"/>
         <pc:sldMkLst>
           <pc:docMk/>
           <pc:sldMk cId="2742093724" sldId="313"/>
@@ -1465,7 +1257,7 @@
           </ac:spMkLst>
         </pc:spChg>
         <pc:spChg chg="mod">
-          <ac:chgData name="Riccardo Berta" userId="c8694f89-bba4-4576-b0a8-456619ca5a8c" providerId="ADAL" clId="{FDDBFC5A-5EA9-5330-BEB8-433D7E3B4C4E}" dt="2025-11-04T13:54:57.376" v="6816" actId="404"/>
+          <ac:chgData name="Riccardo Berta" userId="c8694f89-bba4-4576-b0a8-456619ca5a8c" providerId="ADAL" clId="{FDDBFC5A-5EA9-5330-BEB8-433D7E3B4C4E}" dt="2025-11-07T07:11:46.059" v="9131" actId="20577"/>
           <ac:spMkLst>
             <pc:docMk/>
             <pc:sldMk cId="2742093724" sldId="313"/>
@@ -1534,36 +1326,12 @@
             <ac:spMk id="3" creationId="{2F11F5A8-C704-B256-CB40-71906E899316}"/>
           </ac:spMkLst>
         </pc:spChg>
-        <pc:picChg chg="del">
-          <ac:chgData name="Riccardo Berta" userId="c8694f89-bba4-4576-b0a8-456619ca5a8c" providerId="ADAL" clId="{FDDBFC5A-5EA9-5330-BEB8-433D7E3B4C4E}" dt="2025-11-04T14:42:46.248" v="7678" actId="478"/>
-          <ac:picMkLst>
-            <pc:docMk/>
-            <pc:sldMk cId="1243237745" sldId="315"/>
-            <ac:picMk id="5" creationId="{824A7C9B-D088-6FB2-6DE7-E31DB7798695}"/>
-          </ac:picMkLst>
-        </pc:picChg>
         <pc:picChg chg="add mod">
           <ac:chgData name="Riccardo Berta" userId="c8694f89-bba4-4576-b0a8-456619ca5a8c" providerId="ADAL" clId="{FDDBFC5A-5EA9-5330-BEB8-433D7E3B4C4E}" dt="2025-11-04T14:47:01.651" v="7778" actId="1036"/>
           <ac:picMkLst>
             <pc:docMk/>
             <pc:sldMk cId="1243237745" sldId="315"/>
             <ac:picMk id="6" creationId="{166755B9-3F31-5D52-2FB8-3C2DC52AAC9E}"/>
-          </ac:picMkLst>
-        </pc:picChg>
-        <pc:picChg chg="del">
-          <ac:chgData name="Riccardo Berta" userId="c8694f89-bba4-4576-b0a8-456619ca5a8c" providerId="ADAL" clId="{FDDBFC5A-5EA9-5330-BEB8-433D7E3B4C4E}" dt="2025-11-04T14:42:45.623" v="7677" actId="478"/>
-          <ac:picMkLst>
-            <pc:docMk/>
-            <pc:sldMk cId="1243237745" sldId="315"/>
-            <ac:picMk id="7" creationId="{78D2C697-8013-54D4-75E3-8B0BD5D2B3BF}"/>
-          </ac:picMkLst>
-        </pc:picChg>
-        <pc:picChg chg="del">
-          <ac:chgData name="Riccardo Berta" userId="c8694f89-bba4-4576-b0a8-456619ca5a8c" providerId="ADAL" clId="{FDDBFC5A-5EA9-5330-BEB8-433D7E3B4C4E}" dt="2025-11-04T14:42:45.004" v="7676" actId="478"/>
-          <ac:picMkLst>
-            <pc:docMk/>
-            <pc:sldMk cId="1243237745" sldId="315"/>
-            <ac:picMk id="9" creationId="{30CB6960-07E3-B939-36C3-3EEAC0C3FF70}"/>
           </ac:picMkLst>
         </pc:picChg>
         <pc:picChg chg="add mod">
@@ -1669,8 +1437,8 @@
           </ac:picMkLst>
         </pc:picChg>
       </pc:sldChg>
-      <pc:sldChg chg="addSp modSp add mod">
-        <pc:chgData name="Riccardo Berta" userId="c8694f89-bba4-4576-b0a8-456619ca5a8c" providerId="ADAL" clId="{FDDBFC5A-5EA9-5330-BEB8-433D7E3B4C4E}" dt="2025-11-04T14:58:18.576" v="8085" actId="14100"/>
+      <pc:sldChg chg="addSp delSp modSp add mod">
+        <pc:chgData name="Riccardo Berta" userId="c8694f89-bba4-4576-b0a8-456619ca5a8c" providerId="ADAL" clId="{FDDBFC5A-5EA9-5330-BEB8-433D7E3B4C4E}" dt="2025-11-07T08:05:25.178" v="9147" actId="1076"/>
         <pc:sldMkLst>
           <pc:docMk/>
           <pc:sldMk cId="2931121817" sldId="318"/>
@@ -1700,6 +1468,14 @@
           </ac:picMkLst>
         </pc:picChg>
         <pc:picChg chg="add mod">
+          <ac:chgData name="Riccardo Berta" userId="c8694f89-bba4-4576-b0a8-456619ca5a8c" providerId="ADAL" clId="{FDDBFC5A-5EA9-5330-BEB8-433D7E3B4C4E}" dt="2025-11-07T08:05:23.483" v="9146" actId="14100"/>
+          <ac:picMkLst>
+            <pc:docMk/>
+            <pc:sldMk cId="2931121817" sldId="318"/>
+            <ac:picMk id="6" creationId="{BE5F88AB-C140-704A-8853-FE96CC40B00D}"/>
+          </ac:picMkLst>
+        </pc:picChg>
+        <pc:picChg chg="add mod">
           <ac:chgData name="Riccardo Berta" userId="c8694f89-bba4-4576-b0a8-456619ca5a8c" providerId="ADAL" clId="{FDDBFC5A-5EA9-5330-BEB8-433D7E3B4C4E}" dt="2025-11-04T14:57:32.343" v="8075" actId="1076"/>
           <ac:picMkLst>
             <pc:docMk/>
@@ -1707,8 +1483,8 @@
             <ac:picMk id="7" creationId="{B3784FF9-BC56-ABEE-E123-F3EF3DED2E1A}"/>
           </ac:picMkLst>
         </pc:picChg>
-        <pc:picChg chg="add mod">
-          <ac:chgData name="Riccardo Berta" userId="c8694f89-bba4-4576-b0a8-456619ca5a8c" providerId="ADAL" clId="{FDDBFC5A-5EA9-5330-BEB8-433D7E3B4C4E}" dt="2025-11-04T14:58:04.673" v="8080" actId="14100"/>
+        <pc:picChg chg="add del mod">
+          <ac:chgData name="Riccardo Berta" userId="c8694f89-bba4-4576-b0a8-456619ca5a8c" providerId="ADAL" clId="{FDDBFC5A-5EA9-5330-BEB8-433D7E3B4C4E}" dt="2025-11-07T08:05:16.765" v="9144" actId="478"/>
           <ac:picMkLst>
             <pc:docMk/>
             <pc:sldMk cId="2931121817" sldId="318"/>
@@ -1716,7 +1492,7 @@
           </ac:picMkLst>
         </pc:picChg>
         <pc:picChg chg="add mod">
-          <ac:chgData name="Riccardo Berta" userId="c8694f89-bba4-4576-b0a8-456619ca5a8c" providerId="ADAL" clId="{FDDBFC5A-5EA9-5330-BEB8-433D7E3B4C4E}" dt="2025-11-04T14:58:18.576" v="8085" actId="14100"/>
+          <ac:chgData name="Riccardo Berta" userId="c8694f89-bba4-4576-b0a8-456619ca5a8c" providerId="ADAL" clId="{FDDBFC5A-5EA9-5330-BEB8-433D7E3B4C4E}" dt="2025-11-07T08:05:25.178" v="9147" actId="1076"/>
           <ac:picMkLst>
             <pc:docMk/>
             <pc:sldMk cId="2931121817" sldId="318"/>
@@ -1802,69 +1578,6 @@
           </ac:picMkLst>
         </pc:picChg>
       </pc:sldChg>
-      <pc:sldChg chg="addSp delSp modSp add del mod">
-        <pc:chgData name="Riccardo Berta" userId="c8694f89-bba4-4576-b0a8-456619ca5a8c" providerId="ADAL" clId="{FDDBFC5A-5EA9-5330-BEB8-433D7E3B4C4E}" dt="2025-11-04T15:10:32.640" v="8237" actId="2696"/>
-        <pc:sldMkLst>
-          <pc:docMk/>
-          <pc:sldMk cId="2249301040" sldId="321"/>
-        </pc:sldMkLst>
-        <pc:spChg chg="mod">
-          <ac:chgData name="Riccardo Berta" userId="c8694f89-bba4-4576-b0a8-456619ca5a8c" providerId="ADAL" clId="{FDDBFC5A-5EA9-5330-BEB8-433D7E3B4C4E}" dt="2025-11-04T15:07:49.759" v="8183" actId="20577"/>
-          <ac:spMkLst>
-            <pc:docMk/>
-            <pc:sldMk cId="2249301040" sldId="321"/>
-            <ac:spMk id="2" creationId="{0C829F6B-2F70-A3E7-7442-E830013AC660}"/>
-          </ac:spMkLst>
-        </pc:spChg>
-        <pc:spChg chg="del mod">
-          <ac:chgData name="Riccardo Berta" userId="c8694f89-bba4-4576-b0a8-456619ca5a8c" providerId="ADAL" clId="{FDDBFC5A-5EA9-5330-BEB8-433D7E3B4C4E}" dt="2025-11-04T15:08:04.432" v="8187" actId="478"/>
-          <ac:spMkLst>
-            <pc:docMk/>
-            <pc:sldMk cId="2249301040" sldId="321"/>
-            <ac:spMk id="3" creationId="{1DD8ACD6-B4F6-E2B4-E61E-828634912DC6}"/>
-          </ac:spMkLst>
-        </pc:spChg>
-        <pc:spChg chg="add del mod">
-          <ac:chgData name="Riccardo Berta" userId="c8694f89-bba4-4576-b0a8-456619ca5a8c" providerId="ADAL" clId="{FDDBFC5A-5EA9-5330-BEB8-433D7E3B4C4E}" dt="2025-11-04T15:08:06.027" v="8188" actId="478"/>
-          <ac:spMkLst>
-            <pc:docMk/>
-            <pc:sldMk cId="2249301040" sldId="321"/>
-            <ac:spMk id="7" creationId="{16A49267-EBF7-3192-1C93-089A82F4522F}"/>
-          </ac:spMkLst>
-        </pc:spChg>
-        <pc:picChg chg="add mod">
-          <ac:chgData name="Riccardo Berta" userId="c8694f89-bba4-4576-b0a8-456619ca5a8c" providerId="ADAL" clId="{FDDBFC5A-5EA9-5330-BEB8-433D7E3B4C4E}" dt="2025-11-04T15:08:12.063" v="8191" actId="1076"/>
-          <ac:picMkLst>
-            <pc:docMk/>
-            <pc:sldMk cId="2249301040" sldId="321"/>
-            <ac:picMk id="5" creationId="{2BC7C601-E377-8CBE-B916-DC9877E922D6}"/>
-          </ac:picMkLst>
-        </pc:picChg>
-        <pc:picChg chg="add mod">
-          <ac:chgData name="Riccardo Berta" userId="c8694f89-bba4-4576-b0a8-456619ca5a8c" providerId="ADAL" clId="{FDDBFC5A-5EA9-5330-BEB8-433D7E3B4C4E}" dt="2025-11-04T15:08:57.916" v="8203" actId="1076"/>
-          <ac:picMkLst>
-            <pc:docMk/>
-            <pc:sldMk cId="2249301040" sldId="321"/>
-            <ac:picMk id="9" creationId="{50244EEA-7DEE-5236-00DB-0E9FCAAEB6B6}"/>
-          </ac:picMkLst>
-        </pc:picChg>
-        <pc:picChg chg="add mod">
-          <ac:chgData name="Riccardo Berta" userId="c8694f89-bba4-4576-b0a8-456619ca5a8c" providerId="ADAL" clId="{FDDBFC5A-5EA9-5330-BEB8-433D7E3B4C4E}" dt="2025-11-04T15:09:00.538" v="8204" actId="1076"/>
-          <ac:picMkLst>
-            <pc:docMk/>
-            <pc:sldMk cId="2249301040" sldId="321"/>
-            <ac:picMk id="11" creationId="{BAC38923-7CE6-145B-8746-2DBC10C27269}"/>
-          </ac:picMkLst>
-        </pc:picChg>
-        <pc:picChg chg="add del mod">
-          <ac:chgData name="Riccardo Berta" userId="c8694f89-bba4-4576-b0a8-456619ca5a8c" providerId="ADAL" clId="{FDDBFC5A-5EA9-5330-BEB8-433D7E3B4C4E}" dt="2025-11-04T15:09:37.620" v="8211" actId="478"/>
-          <ac:picMkLst>
-            <pc:docMk/>
-            <pc:sldMk cId="2249301040" sldId="321"/>
-            <ac:picMk id="13" creationId="{F2F5C035-B6B7-6C59-954D-ECECA894B3AA}"/>
-          </ac:picMkLst>
-        </pc:picChg>
-      </pc:sldChg>
       <pc:sldChg chg="addSp modSp add mod">
         <pc:chgData name="Riccardo Berta" userId="c8694f89-bba4-4576-b0a8-456619ca5a8c" providerId="ADAL" clId="{FDDBFC5A-5EA9-5330-BEB8-433D7E3B4C4E}" dt="2025-11-04T15:12:27.453" v="8295" actId="20577"/>
         <pc:sldMkLst>
@@ -1942,14 +1655,6 @@
             <ac:spMk id="3" creationId="{8D7066B4-0C3A-6E0A-8FFB-88C74AAA8839}"/>
           </ac:spMkLst>
         </pc:spChg>
-        <pc:picChg chg="add del mod">
-          <ac:chgData name="Riccardo Berta" userId="c8694f89-bba4-4576-b0a8-456619ca5a8c" providerId="ADAL" clId="{FDDBFC5A-5EA9-5330-BEB8-433D7E3B4C4E}" dt="2025-11-04T15:13:23.040" v="8301" actId="478"/>
-          <ac:picMkLst>
-            <pc:docMk/>
-            <pc:sldMk cId="1350616190" sldId="323"/>
-            <ac:picMk id="5" creationId="{E2B2DE6E-C3C4-2732-898D-409DDB16CECC}"/>
-          </ac:picMkLst>
-        </pc:picChg>
         <pc:picChg chg="add mod">
           <ac:chgData name="Riccardo Berta" userId="c8694f89-bba4-4576-b0a8-456619ca5a8c" providerId="ADAL" clId="{FDDBFC5A-5EA9-5330-BEB8-433D7E3B4C4E}" dt="2025-11-04T15:19:27.829" v="8417" actId="1076"/>
           <ac:picMkLst>
@@ -1960,7 +1665,7 @@
         </pc:picChg>
       </pc:sldChg>
       <pc:sldChg chg="addSp delSp modSp add mod">
-        <pc:chgData name="Riccardo Berta" userId="c8694f89-bba4-4576-b0a8-456619ca5a8c" providerId="ADAL" clId="{FDDBFC5A-5EA9-5330-BEB8-433D7E3B4C4E}" dt="2025-11-04T15:17:29.384" v="8385" actId="1076"/>
+        <pc:chgData name="Riccardo Berta" userId="c8694f89-bba4-4576-b0a8-456619ca5a8c" providerId="ADAL" clId="{FDDBFC5A-5EA9-5330-BEB8-433D7E3B4C4E}" dt="2025-11-07T08:12:56.497" v="9150" actId="478"/>
         <pc:sldMkLst>
           <pc:docMk/>
           <pc:sldMk cId="2083114547" sldId="324"/>
@@ -1973,22 +1678,14 @@
             <ac:spMk id="2" creationId="{7DEDF712-237E-2A19-B3BC-938D916E6A07}"/>
           </ac:spMkLst>
         </pc:spChg>
-        <pc:spChg chg="del">
-          <ac:chgData name="Riccardo Berta" userId="c8694f89-bba4-4576-b0a8-456619ca5a8c" providerId="ADAL" clId="{FDDBFC5A-5EA9-5330-BEB8-433D7E3B4C4E}" dt="2025-11-04T15:17:13.099" v="8381" actId="478"/>
-          <ac:spMkLst>
+        <pc:picChg chg="add del mod">
+          <ac:chgData name="Riccardo Berta" userId="c8694f89-bba4-4576-b0a8-456619ca5a8c" providerId="ADAL" clId="{FDDBFC5A-5EA9-5330-BEB8-433D7E3B4C4E}" dt="2025-11-07T08:12:56.497" v="9150" actId="478"/>
+          <ac:picMkLst>
             <pc:docMk/>
             <pc:sldMk cId="2083114547" sldId="324"/>
-            <ac:spMk id="3" creationId="{B868424B-A905-E615-1063-135E937258B6}"/>
-          </ac:spMkLst>
-        </pc:spChg>
-        <pc:spChg chg="add del mod">
-          <ac:chgData name="Riccardo Berta" userId="c8694f89-bba4-4576-b0a8-456619ca5a8c" providerId="ADAL" clId="{FDDBFC5A-5EA9-5330-BEB8-433D7E3B4C4E}" dt="2025-11-04T15:17:18.763" v="8382" actId="478"/>
-          <ac:spMkLst>
-            <pc:docMk/>
-            <pc:sldMk cId="2083114547" sldId="324"/>
-            <ac:spMk id="7" creationId="{330B07BC-1D38-58BC-E4FA-36E96F26914F}"/>
-          </ac:spMkLst>
-        </pc:spChg>
+            <ac:picMk id="3" creationId="{F433483D-A060-7E8F-B7F0-D4F4DC941816}"/>
+          </ac:picMkLst>
+        </pc:picChg>
         <pc:picChg chg="add mod">
           <ac:chgData name="Riccardo Berta" userId="c8694f89-bba4-4576-b0a8-456619ca5a8c" providerId="ADAL" clId="{FDDBFC5A-5EA9-5330-BEB8-433D7E3B4C4E}" dt="2025-11-04T15:17:29.384" v="8385" actId="1076"/>
           <ac:picMkLst>
@@ -1999,7 +1696,7 @@
         </pc:picChg>
       </pc:sldChg>
       <pc:sldChg chg="addSp delSp modSp add mod">
-        <pc:chgData name="Riccardo Berta" userId="c8694f89-bba4-4576-b0a8-456619ca5a8c" providerId="ADAL" clId="{FDDBFC5A-5EA9-5330-BEB8-433D7E3B4C4E}" dt="2025-11-04T15:29:23.117" v="8573" actId="14100"/>
+        <pc:chgData name="Riccardo Berta" userId="c8694f89-bba4-4576-b0a8-456619ca5a8c" providerId="ADAL" clId="{FDDBFC5A-5EA9-5330-BEB8-433D7E3B4C4E}" dt="2025-11-07T08:13:24.240" v="9160" actId="14100"/>
         <pc:sldMkLst>
           <pc:docMk/>
           <pc:sldMk cId="3026967211" sldId="325"/>
@@ -2021,6 +1718,14 @@
           </ac:spMkLst>
         </pc:spChg>
         <pc:picChg chg="add mod">
+          <ac:chgData name="Riccardo Berta" userId="c8694f89-bba4-4576-b0a8-456619ca5a8c" providerId="ADAL" clId="{FDDBFC5A-5EA9-5330-BEB8-433D7E3B4C4E}" dt="2025-11-07T08:13:03.648" v="9152" actId="1076"/>
+          <ac:picMkLst>
+            <pc:docMk/>
+            <pc:sldMk cId="3026967211" sldId="325"/>
+            <ac:picMk id="4" creationId="{524F8748-AAE3-19E4-7670-678A89C81AC2}"/>
+          </ac:picMkLst>
+        </pc:picChg>
+        <pc:picChg chg="add mod">
           <ac:chgData name="Riccardo Berta" userId="c8694f89-bba4-4576-b0a8-456619ca5a8c" providerId="ADAL" clId="{FDDBFC5A-5EA9-5330-BEB8-433D7E3B4C4E}" dt="2025-11-04T15:28:31.320" v="8548" actId="1076"/>
           <ac:picMkLst>
             <pc:docMk/>
@@ -2028,12 +1733,12 @@
             <ac:picMk id="5" creationId="{14EF04E3-44A9-4ECD-A81B-27F21E1D99F1}"/>
           </ac:picMkLst>
         </pc:picChg>
-        <pc:picChg chg="add del mod">
-          <ac:chgData name="Riccardo Berta" userId="c8694f89-bba4-4576-b0a8-456619ca5a8c" providerId="ADAL" clId="{FDDBFC5A-5EA9-5330-BEB8-433D7E3B4C4E}" dt="2025-11-04T15:27:12.438" v="8527" actId="478"/>
+        <pc:picChg chg="add mod">
+          <ac:chgData name="Riccardo Berta" userId="c8694f89-bba4-4576-b0a8-456619ca5a8c" providerId="ADAL" clId="{FDDBFC5A-5EA9-5330-BEB8-433D7E3B4C4E}" dt="2025-11-07T08:13:24.240" v="9160" actId="14100"/>
           <ac:picMkLst>
             <pc:docMk/>
             <pc:sldMk cId="3026967211" sldId="325"/>
-            <ac:picMk id="7" creationId="{53E60535-8B31-11E8-B398-10BA22B02C8F}"/>
+            <ac:picMk id="7" creationId="{680C3EE4-12AC-4406-9717-F1D7E7AFD3BB}"/>
           </ac:picMkLst>
         </pc:picChg>
         <pc:picChg chg="add mod">
@@ -2044,8 +1749,8 @@
             <ac:picMk id="9" creationId="{45841EC8-8BBA-E9FA-C676-75869F98DFF0}"/>
           </ac:picMkLst>
         </pc:picChg>
-        <pc:picChg chg="add mod">
-          <ac:chgData name="Riccardo Berta" userId="c8694f89-bba4-4576-b0a8-456619ca5a8c" providerId="ADAL" clId="{FDDBFC5A-5EA9-5330-BEB8-433D7E3B4C4E}" dt="2025-11-04T15:29:23.117" v="8573" actId="14100"/>
+        <pc:picChg chg="add del mod">
+          <ac:chgData name="Riccardo Berta" userId="c8694f89-bba4-4576-b0a8-456619ca5a8c" providerId="ADAL" clId="{FDDBFC5A-5EA9-5330-BEB8-433D7E3B4C4E}" dt="2025-11-07T08:13:13.222" v="9156" actId="478"/>
           <ac:picMkLst>
             <pc:docMk/>
             <pc:sldMk cId="3026967211" sldId="325"/>
@@ -2083,17 +1788,9 @@
             <ac:picMk id="5" creationId="{9D94B5CC-2144-5A25-16AB-B89EA36230DA}"/>
           </ac:picMkLst>
         </pc:picChg>
-        <pc:picChg chg="del">
-          <ac:chgData name="Riccardo Berta" userId="c8694f89-bba4-4576-b0a8-456619ca5a8c" providerId="ADAL" clId="{FDDBFC5A-5EA9-5330-BEB8-433D7E3B4C4E}" dt="2025-11-04T15:29:46.845" v="8584" actId="478"/>
-          <ac:picMkLst>
-            <pc:docMk/>
-            <pc:sldMk cId="2942093593" sldId="326"/>
-            <ac:picMk id="7" creationId="{9E4134CE-E200-8A0E-B01D-01F81AACAB61}"/>
-          </ac:picMkLst>
-        </pc:picChg>
       </pc:sldChg>
       <pc:sldChg chg="addSp modSp add mod">
-        <pc:chgData name="Riccardo Berta" userId="c8694f89-bba4-4576-b0a8-456619ca5a8c" providerId="ADAL" clId="{FDDBFC5A-5EA9-5330-BEB8-433D7E3B4C4E}" dt="2025-11-04T15:41:22.039" v="8919" actId="404"/>
+        <pc:chgData name="Riccardo Berta" userId="c8694f89-bba4-4576-b0a8-456619ca5a8c" providerId="ADAL" clId="{FDDBFC5A-5EA9-5330-BEB8-433D7E3B4C4E}" dt="2025-11-07T08:14:17.977" v="9166" actId="20577"/>
         <pc:sldMkLst>
           <pc:docMk/>
           <pc:sldMk cId="4105368042" sldId="327"/>
@@ -2107,7 +1804,7 @@
           </ac:spMkLst>
         </pc:spChg>
         <pc:spChg chg="mod">
-          <ac:chgData name="Riccardo Berta" userId="c8694f89-bba4-4576-b0a8-456619ca5a8c" providerId="ADAL" clId="{FDDBFC5A-5EA9-5330-BEB8-433D7E3B4C4E}" dt="2025-11-04T15:41:22.039" v="8919" actId="404"/>
+          <ac:chgData name="Riccardo Berta" userId="c8694f89-bba4-4576-b0a8-456619ca5a8c" providerId="ADAL" clId="{FDDBFC5A-5EA9-5330-BEB8-433D7E3B4C4E}" dt="2025-11-07T08:14:17.977" v="9166" actId="20577"/>
           <ac:spMkLst>
             <pc:docMk/>
             <pc:sldMk cId="4105368042" sldId="327"/>
@@ -2153,14 +1850,6 @@
             <ac:spMk id="3" creationId="{AB4A3BC3-2578-9895-B331-D69A461BE656}"/>
           </ac:spMkLst>
         </pc:spChg>
-        <pc:picChg chg="add del mod">
-          <ac:chgData name="Riccardo Berta" userId="c8694f89-bba4-4576-b0a8-456619ca5a8c" providerId="ADAL" clId="{FDDBFC5A-5EA9-5330-BEB8-433D7E3B4C4E}" dt="2025-11-04T15:43:14.390" v="8922" actId="478"/>
-          <ac:picMkLst>
-            <pc:docMk/>
-            <pc:sldMk cId="895266628" sldId="328"/>
-            <ac:picMk id="5" creationId="{5AD3F737-3CC1-503B-27F4-3B10FD084C4B}"/>
-          </ac:picMkLst>
-        </pc:picChg>
         <pc:picChg chg="add mod">
           <ac:chgData name="Riccardo Berta" userId="c8694f89-bba4-4576-b0a8-456619ca5a8c" providerId="ADAL" clId="{FDDBFC5A-5EA9-5330-BEB8-433D7E3B4C4E}" dt="2025-11-04T15:46:14.297" v="8994" actId="1076"/>
           <ac:picMkLst>
@@ -2192,38 +1881,6 @@
             <ac:spMk id="2" creationId="{0348B981-D6BA-BAC8-D0C1-FC99CEA32277}"/>
           </ac:spMkLst>
         </pc:spChg>
-        <pc:spChg chg="del">
-          <ac:chgData name="Riccardo Berta" userId="c8694f89-bba4-4576-b0a8-456619ca5a8c" providerId="ADAL" clId="{FDDBFC5A-5EA9-5330-BEB8-433D7E3B4C4E}" dt="2025-11-04T15:48:05.125" v="9006" actId="478"/>
-          <ac:spMkLst>
-            <pc:docMk/>
-            <pc:sldMk cId="4139064395" sldId="329"/>
-            <ac:spMk id="3" creationId="{57C01C11-DEB0-660D-CD81-006D255B16EE}"/>
-          </ac:spMkLst>
-        </pc:spChg>
-        <pc:spChg chg="add del mod">
-          <ac:chgData name="Riccardo Berta" userId="c8694f89-bba4-4576-b0a8-456619ca5a8c" providerId="ADAL" clId="{FDDBFC5A-5EA9-5330-BEB8-433D7E3B4C4E}" dt="2025-11-04T15:48:06.939" v="9007" actId="478"/>
-          <ac:spMkLst>
-            <pc:docMk/>
-            <pc:sldMk cId="4139064395" sldId="329"/>
-            <ac:spMk id="7" creationId="{367FEA42-E01D-FD89-53C4-F0135E256001}"/>
-          </ac:spMkLst>
-        </pc:spChg>
-        <pc:picChg chg="add del mod">
-          <ac:chgData name="Riccardo Berta" userId="c8694f89-bba4-4576-b0a8-456619ca5a8c" providerId="ADAL" clId="{FDDBFC5A-5EA9-5330-BEB8-433D7E3B4C4E}" dt="2025-11-04T15:49:32.183" v="9025" actId="478"/>
-          <ac:picMkLst>
-            <pc:docMk/>
-            <pc:sldMk cId="4139064395" sldId="329"/>
-            <ac:picMk id="5" creationId="{9C41459A-017E-6048-AC09-843DE0515E78}"/>
-          </ac:picMkLst>
-        </pc:picChg>
-        <pc:picChg chg="add del mod">
-          <ac:chgData name="Riccardo Berta" userId="c8694f89-bba4-4576-b0a8-456619ca5a8c" providerId="ADAL" clId="{FDDBFC5A-5EA9-5330-BEB8-433D7E3B4C4E}" dt="2025-11-04T15:50:40.679" v="9047" actId="478"/>
-          <ac:picMkLst>
-            <pc:docMk/>
-            <pc:sldMk cId="4139064395" sldId="329"/>
-            <ac:picMk id="9" creationId="{C88148C7-AC37-4382-44F6-9565D30C52D5}"/>
-          </ac:picMkLst>
-        </pc:picChg>
         <pc:picChg chg="add mod">
           <ac:chgData name="Riccardo Berta" userId="c8694f89-bba4-4576-b0a8-456619ca5a8c" providerId="ADAL" clId="{FDDBFC5A-5EA9-5330-BEB8-433D7E3B4C4E}" dt="2025-11-04T15:51:00.847" v="9055" actId="1035"/>
           <ac:picMkLst>
@@ -2234,7 +1891,7 @@
         </pc:picChg>
       </pc:sldChg>
       <pc:sldChg chg="modSp add mod">
-        <pc:chgData name="Riccardo Berta" userId="c8694f89-bba4-4576-b0a8-456619ca5a8c" providerId="ADAL" clId="{FDDBFC5A-5EA9-5330-BEB8-433D7E3B4C4E}" dt="2025-11-04T15:50:07.705" v="9042" actId="20577"/>
+        <pc:chgData name="Riccardo Berta" userId="c8694f89-bba4-4576-b0a8-456619ca5a8c" providerId="ADAL" clId="{FDDBFC5A-5EA9-5330-BEB8-433D7E3B4C4E}" dt="2025-11-07T07:16:56.934" v="9139" actId="113"/>
         <pc:sldMkLst>
           <pc:docMk/>
           <pc:sldMk cId="3086867635" sldId="330"/>
@@ -2248,27 +1905,13 @@
           </ac:spMkLst>
         </pc:spChg>
         <pc:spChg chg="mod">
-          <ac:chgData name="Riccardo Berta" userId="c8694f89-bba4-4576-b0a8-456619ca5a8c" providerId="ADAL" clId="{FDDBFC5A-5EA9-5330-BEB8-433D7E3B4C4E}" dt="2025-11-04T15:50:05.283" v="9040" actId="20577"/>
+          <ac:chgData name="Riccardo Berta" userId="c8694f89-bba4-4576-b0a8-456619ca5a8c" providerId="ADAL" clId="{FDDBFC5A-5EA9-5330-BEB8-433D7E3B4C4E}" dt="2025-11-07T07:16:56.934" v="9139" actId="113"/>
           <ac:spMkLst>
             <pc:docMk/>
             <pc:sldMk cId="3086867635" sldId="330"/>
             <ac:spMk id="3" creationId="{6BF34A27-DF3B-F677-3D89-225A91418348}"/>
           </ac:spMkLst>
         </pc:spChg>
-      </pc:sldChg>
-      <pc:sldChg chg="add del">
-        <pc:chgData name="Riccardo Berta" userId="c8694f89-bba4-4576-b0a8-456619ca5a8c" providerId="ADAL" clId="{FDDBFC5A-5EA9-5330-BEB8-433D7E3B4C4E}" dt="2025-11-04T15:51:05.082" v="9056" actId="2696"/>
-        <pc:sldMkLst>
-          <pc:docMk/>
-          <pc:sldMk cId="1093585841" sldId="331"/>
-        </pc:sldMkLst>
-      </pc:sldChg>
-      <pc:sldChg chg="add del">
-        <pc:chgData name="Riccardo Berta" userId="c8694f89-bba4-4576-b0a8-456619ca5a8c" providerId="ADAL" clId="{FDDBFC5A-5EA9-5330-BEB8-433D7E3B4C4E}" dt="2025-11-04T15:51:05.596" v="9057" actId="2696"/>
-        <pc:sldMkLst>
-          <pc:docMk/>
-          <pc:sldMk cId="3961019333" sldId="332"/>
-        </pc:sldMkLst>
       </pc:sldChg>
     </pc:docChg>
   </pc:docChgLst>
@@ -12421,7 +12064,7 @@
             </a:r>
             <a:r>
               <a:rPr lang="en-GB" noProof="0" dirty="0"/>
-              <a:t> (when design is turned into hardware </a:t>
+              <a:t> (when design is turned into hardware) </a:t>
             </a:r>
           </a:p>
           <a:p>
@@ -12648,6 +12291,9 @@
             </a:r>
           </a:p>
           <a:p>
+            <a:endParaRPr lang="en-GB" noProof="0" dirty="0"/>
+          </a:p>
+          <a:p>
             <a:r>
               <a:rPr lang="en-GB" noProof="0" dirty="0"/>
               <a:t>The operators defined for this type include </a:t>
@@ -12737,7 +12383,7 @@
         </p:blipFill>
         <p:spPr>
           <a:xfrm>
-            <a:off x="997855" y="3182713"/>
+            <a:off x="997855" y="3436225"/>
             <a:ext cx="2333173" cy="673805"/>
           </a:xfrm>
           <a:prstGeom prst="rect">
@@ -12955,7 +12601,7 @@
             </a:r>
             <a:r>
               <a:rPr lang="en-GB" b="1" noProof="0" dirty="0"/>
-              <a:t>**most significant bit**</a:t>
+              <a:t>most significant bit</a:t>
             </a:r>
             <a:endParaRPr lang="en-GB" b="1" dirty="0"/>
           </a:p>
@@ -12992,6 +12638,10 @@
               <a:rPr lang="en-GB" dirty="0"/>
               <a:t> </a:t>
             </a:r>
+          </a:p>
+          <a:p>
+            <a:pPr lvl="1"/>
+            <a:endParaRPr lang="en-GB" dirty="0"/>
           </a:p>
           <a:p>
             <a:pPr lvl="1"/>
@@ -13102,7 +12752,7 @@
         </p:blipFill>
         <p:spPr>
           <a:xfrm>
-            <a:off x="1389140" y="4047100"/>
+            <a:off x="1461027" y="4626632"/>
             <a:ext cx="5795432" cy="589009"/>
           </a:xfrm>
           <a:prstGeom prst="rect">
@@ -13132,7 +12782,7 @@
         </p:blipFill>
         <p:spPr>
           <a:xfrm>
-            <a:off x="1389140" y="5320401"/>
+            <a:off x="1328283" y="5614905"/>
             <a:ext cx="3030460" cy="286665"/>
           </a:xfrm>
           <a:prstGeom prst="rect">
@@ -13684,7 +13334,7 @@
             </a:pPr>
             <a:r>
               <a:rPr lang="en-GB" dirty="0"/>
-              <a:t>Z’ : high impedance</a:t>
+              <a:t>Z : high impedance</a:t>
             </a:r>
           </a:p>
           <a:p>
@@ -16424,10 +16074,10 @@
       </p:pic>
       <p:pic>
         <p:nvPicPr>
-          <p:cNvPr id="9" name="Immagine 8" descr="Immagine che contiene testo, Carattere, bianco, schermata&#10;&#10;Il contenuto generato dall'IA potrebbe non essere corretto.">
+          <p:cNvPr id="11" name="Immagine 10" descr="Immagine che contiene testo, Carattere, bianco, schermata&#10;&#10;Il contenuto generato dall'IA potrebbe non essere corretto.">
             <a:extLst>
               <a:ext uri="{FF2B5EF4-FFF2-40B4-BE49-F238E27FC236}">
-                <a16:creationId xmlns:a16="http://schemas.microsoft.com/office/drawing/2014/main" id="{6A9FBFE8-6FCB-B583-8F64-86173858FFF0}"/>
+                <a16:creationId xmlns:a16="http://schemas.microsoft.com/office/drawing/2014/main" id="{F9E64BD4-8922-C74D-3432-EF2727EA015D}"/>
               </a:ext>
             </a:extLst>
           </p:cNvPr>
@@ -16444,8 +16094,8 @@
         </p:blipFill>
         <p:spPr>
           <a:xfrm>
-            <a:off x="850900" y="4674000"/>
-            <a:ext cx="3217990" cy="963280"/>
+            <a:off x="850900" y="5728601"/>
+            <a:ext cx="3217990" cy="708166"/>
           </a:xfrm>
           <a:prstGeom prst="rect">
             <a:avLst/>
@@ -16454,10 +16104,10 @@
       </p:pic>
       <p:pic>
         <p:nvPicPr>
-          <p:cNvPr id="11" name="Immagine 10" descr="Immagine che contiene testo, Carattere, bianco, schermata&#10;&#10;Il contenuto generato dall'IA potrebbe non essere corretto.">
+          <p:cNvPr id="6" name="Immagine 5" descr="Immagine che contiene testo, Carattere, bianco, algebra&#10;&#10;Il contenuto generato dall'IA potrebbe non essere corretto.">
             <a:extLst>
               <a:ext uri="{FF2B5EF4-FFF2-40B4-BE49-F238E27FC236}">
-                <a16:creationId xmlns:a16="http://schemas.microsoft.com/office/drawing/2014/main" id="{F9E64BD4-8922-C74D-3432-EF2727EA015D}"/>
+                <a16:creationId xmlns:a16="http://schemas.microsoft.com/office/drawing/2014/main" id="{BE5F88AB-C140-704A-8853-FE96CC40B00D}"/>
               </a:ext>
             </a:extLst>
           </p:cNvPr>
@@ -16474,8 +16124,8 @@
         </p:blipFill>
         <p:spPr>
           <a:xfrm>
-            <a:off x="850900" y="5785342"/>
-            <a:ext cx="3217990" cy="708166"/>
+            <a:off x="850900" y="4611915"/>
+            <a:ext cx="3296557" cy="1002836"/>
           </a:xfrm>
           <a:prstGeom prst="rect">
             <a:avLst/>
@@ -17802,10 +17452,10 @@
       </p:pic>
       <p:pic>
         <p:nvPicPr>
-          <p:cNvPr id="11" name="Immagine 10">
+          <p:cNvPr id="4" name="Immagine 3">
             <a:extLst>
               <a:ext uri="{FF2B5EF4-FFF2-40B4-BE49-F238E27FC236}">
-                <a16:creationId xmlns:a16="http://schemas.microsoft.com/office/drawing/2014/main" id="{D9CEB68C-E7CD-91DA-CEA5-69CEEC2DE226}"/>
+                <a16:creationId xmlns:a16="http://schemas.microsoft.com/office/drawing/2014/main" id="{524F8748-AAE3-19E4-7670-678A89C81AC2}"/>
               </a:ext>
             </a:extLst>
           </p:cNvPr>
@@ -17822,8 +17472,38 @@
         </p:blipFill>
         <p:spPr>
           <a:xfrm>
-            <a:off x="948872" y="4609921"/>
-            <a:ext cx="3002642" cy="1996794"/>
+            <a:off x="4288581" y="4842473"/>
+            <a:ext cx="4635500" cy="1701800"/>
+          </a:xfrm>
+          <a:prstGeom prst="rect">
+            <a:avLst/>
+          </a:prstGeom>
+        </p:spPr>
+      </p:pic>
+      <p:pic>
+        <p:nvPicPr>
+          <p:cNvPr id="7" name="Immagine 6" descr="Immagine che contiene testo, Carattere, schermata, numero&#10;&#10;Il contenuto generato dall'IA potrebbe non essere corretto.">
+            <a:extLst>
+              <a:ext uri="{FF2B5EF4-FFF2-40B4-BE49-F238E27FC236}">
+                <a16:creationId xmlns:a16="http://schemas.microsoft.com/office/drawing/2014/main" id="{680C3EE4-12AC-4406-9717-F1D7E7AFD3BB}"/>
+              </a:ext>
+            </a:extLst>
+          </p:cNvPr>
+          <p:cNvPicPr>
+            <a:picLocks noChangeAspect="1"/>
+          </p:cNvPicPr>
+          <p:nvPr/>
+        </p:nvPicPr>
+        <p:blipFill>
+          <a:blip r:embed="rId5"/>
+          <a:stretch>
+            <a:fillRect/>
+          </a:stretch>
+        </p:blipFill>
+        <p:spPr>
+          <a:xfrm>
+            <a:off x="948872" y="4628685"/>
+            <a:ext cx="2771490" cy="1915588"/>
           </a:xfrm>
           <a:prstGeom prst="rect">
             <a:avLst/>
@@ -18653,8 +18333,12 @@
               </a:spcAft>
             </a:pPr>
             <a:r>
-              <a:rPr lang="en-GB" noProof="0" dirty="0"/>
-              <a:t>hardware this statement continuously monitors these signals in parallel</a:t>
+              <a:rPr lang="en-GB" dirty="0" err="1"/>
+              <a:t>i</a:t>
+            </a:r>
+            <a:r>
+              <a:rPr lang="en-GB" noProof="0" dirty="0"/>
+              <a:t>n hardware this statement continuously monitors these signals in parallel</a:t>
             </a:r>
           </a:p>
           <a:p>
@@ -19236,20 +18920,18 @@
           <a:lstStyle/>
           <a:p>
             <a:r>
-              <a:rPr lang="en-GB" dirty="0"/>
-              <a:t>Testbenches are </a:t>
-            </a:r>
-            <a:r>
               <a:rPr lang="en-GB" b="1" dirty="0"/>
-              <a:t>simulated</a:t>
-            </a:r>
-            <a:r>
-              <a:rPr lang="en-GB" dirty="0"/>
-              <a:t> in the same way as other HDL modules; however, they are </a:t>
-            </a:r>
+              <a:t>Simulated</a:t>
+            </a:r>
+            <a:r>
+              <a:rPr lang="en-GB" dirty="0"/>
+              <a:t> in the same way as other HDL modules</a:t>
+            </a:r>
+          </a:p>
+          <a:p>
             <a:r>
               <a:rPr lang="en-GB" b="1" dirty="0"/>
-              <a:t>not synthesizable</a:t>
+              <a:t>Not synthesizable</a:t>
             </a:r>
             <a:r>
               <a:rPr lang="en-GB" dirty="0"/>
@@ -21297,15 +20979,6 @@
 </file>
 
 <file path=customXml/item1.xml><?xml version="1.0" encoding="utf-8"?>
-<?mso-contentType ?>
-<FormTemplates xmlns="http://schemas.microsoft.com/sharepoint/v3/contenttype/forms">
-  <Display>DocumentLibraryForm</Display>
-  <Edit>DocumentLibraryForm</Edit>
-  <New>DocumentLibraryForm</New>
-</FormTemplates>
-</file>
-
-<file path=customXml/item2.xml><?xml version="1.0" encoding="utf-8"?>
 <p:properties xmlns:p="http://schemas.microsoft.com/office/2006/metadata/properties" xmlns:xsi="http://www.w3.org/2001/XMLSchema-instance" xmlns:pc="http://schemas.microsoft.com/office/infopath/2007/PartnerControls">
   <documentManagement>
     <TaxCatchAll xmlns="e9b5433c-2372-4cb7-8bab-09518096b29b" xsi:nil="true"/>
@@ -21316,7 +20989,7 @@
 </p:properties>
 </file>
 
-<file path=customXml/item3.xml><?xml version="1.0" encoding="utf-8"?>
+<file path=customXml/item2.xml><?xml version="1.0" encoding="utf-8"?>
 <ct:contentTypeSchema xmlns:ct="http://schemas.microsoft.com/office/2006/metadata/contentType" xmlns:ma="http://schemas.microsoft.com/office/2006/metadata/properties/metaAttributes" ct:_="" ma:_="" ma:contentTypeName="Documento" ma:contentTypeID="0x010100B8FA822B18A0634FB7342CF29752587A" ma:contentTypeVersion="12" ma:contentTypeDescription="Creare un nuovo documento." ma:contentTypeScope="" ma:versionID="4c8b1e8002f5a6c880c83187af115cef">
   <xsd:schema xmlns:xsd="http://www.w3.org/2001/XMLSchema" xmlns:xs="http://www.w3.org/2001/XMLSchema" xmlns:p="http://schemas.microsoft.com/office/2006/metadata/properties" xmlns:ns2="3bd0d43f-5e5b-43cd-b6fc-691bd77672c6" xmlns:ns3="e9b5433c-2372-4cb7-8bab-09518096b29b" targetNamespace="http://schemas.microsoft.com/office/2006/metadata/properties" ma:root="true" ma:fieldsID="618b708abf3b656f834d84e193700042" ns2:_="" ns3:_="">
     <xsd:import namespace="3bd0d43f-5e5b-43cd-b6fc-691bd77672c6"/>
@@ -21517,32 +21190,33 @@
 </ct:contentTypeSchema>
 </file>
 
+<file path=customXml/item3.xml><?xml version="1.0" encoding="utf-8"?>
+<?mso-contentType ?>
+<FormTemplates xmlns="http://schemas.microsoft.com/sharepoint/v3/contenttype/forms">
+  <Display>DocumentLibraryForm</Display>
+  <Edit>DocumentLibraryForm</Edit>
+  <New>DocumentLibraryForm</New>
+</FormTemplates>
+</file>
+
 <file path=customXml/itemProps1.xml><?xml version="1.0" encoding="utf-8"?>
-<ds:datastoreItem xmlns:ds="http://schemas.openxmlformats.org/officeDocument/2006/customXml" ds:itemID="{A1573670-86A5-481D-B06C-CD125DA564CC}">
+<ds:datastoreItem xmlns:ds="http://schemas.openxmlformats.org/officeDocument/2006/customXml" ds:itemID="{1415B781-5FE3-43F9-8381-1BCC156E62C6}">
   <ds:schemaRefs>
-    <ds:schemaRef ds:uri="http://schemas.microsoft.com/sharepoint/v3/contenttype/forms"/>
+    <ds:schemaRef ds:uri="http://schemas.openxmlformats.org/package/2006/metadata/core-properties"/>
+    <ds:schemaRef ds:uri="http://schemas.microsoft.com/office/2006/documentManagement/types"/>
+    <ds:schemaRef ds:uri="http://purl.org/dc/elements/1.1/"/>
+    <ds:schemaRef ds:uri="http://schemas.microsoft.com/office/infopath/2007/PartnerControls"/>
+    <ds:schemaRef ds:uri="http://www.w3.org/XML/1998/namespace"/>
+    <ds:schemaRef ds:uri="e9b5433c-2372-4cb7-8bab-09518096b29b"/>
+    <ds:schemaRef ds:uri="http://purl.org/dc/dcmitype/"/>
+    <ds:schemaRef ds:uri="http://schemas.microsoft.com/office/2006/metadata/properties"/>
+    <ds:schemaRef ds:uri="3bd0d43f-5e5b-43cd-b6fc-691bd77672c6"/>
+    <ds:schemaRef ds:uri="http://purl.org/dc/terms/"/>
   </ds:schemaRefs>
 </ds:datastoreItem>
 </file>
 
 <file path=customXml/itemProps2.xml><?xml version="1.0" encoding="utf-8"?>
-<ds:datastoreItem xmlns:ds="http://schemas.openxmlformats.org/officeDocument/2006/customXml" ds:itemID="{1415B781-5FE3-43F9-8381-1BCC156E62C6}">
-  <ds:schemaRefs>
-    <ds:schemaRef ds:uri="http://schemas.microsoft.com/office/2006/documentManagement/types"/>
-    <ds:schemaRef ds:uri="http://www.w3.org/XML/1998/namespace"/>
-    <ds:schemaRef ds:uri="http://schemas.openxmlformats.org/package/2006/metadata/core-properties"/>
-    <ds:schemaRef ds:uri="http://purl.org/dc/dcmitype/"/>
-    <ds:schemaRef ds:uri="http://purl.org/dc/elements/1.1/"/>
-    <ds:schemaRef ds:uri="http://schemas.microsoft.com/office/2006/metadata/properties"/>
-    <ds:schemaRef ds:uri="3bd0d43f-5e5b-43cd-b6fc-691bd77672c6"/>
-    <ds:schemaRef ds:uri="http://schemas.microsoft.com/office/infopath/2007/PartnerControls"/>
-    <ds:schemaRef ds:uri="e9b5433c-2372-4cb7-8bab-09518096b29b"/>
-    <ds:schemaRef ds:uri="http://purl.org/dc/terms/"/>
-  </ds:schemaRefs>
-</ds:datastoreItem>
-</file>
-
-<file path=customXml/itemProps3.xml><?xml version="1.0" encoding="utf-8"?>
 <ds:datastoreItem xmlns:ds="http://schemas.openxmlformats.org/officeDocument/2006/customXml" ds:itemID="{88909329-C4D5-4649-B44A-DEFE6254F89F}">
   <ds:schemaRefs>
     <ds:schemaRef ds:uri="http://schemas.microsoft.com/office/2006/metadata/contentType"/>
@@ -21559,4 +21233,12 @@
     <ds:schemaRef ds:uri="http://schemas.microsoft.com/internal/obd"/>
   </ds:schemaRefs>
 </ds:datastoreItem>
+</file>
+
+<file path=customXml/itemProps3.xml><?xml version="1.0" encoding="utf-8"?>
+<ds:datastoreItem xmlns:ds="http://schemas.openxmlformats.org/officeDocument/2006/customXml" ds:itemID="{A1573670-86A5-481D-B06C-CD125DA564CC}">
+  <ds:schemaRefs>
+    <ds:schemaRef ds:uri="http://schemas.microsoft.com/sharepoint/v3/contenttype/forms"/>
+  </ds:schemaRefs>
+</ds:datastoreItem>
 </file>
</xml_diff>